<commit_message>
Letzte TK TOM geradegebogen
</commit_message>
<xml_diff>
--- a/agile moves/Tomatoes (TOM)/ger_TOM_06_Tomatenmeeting.pptx
+++ b/agile moves/Tomatoes (TOM)/ger_TOM_06_Tomatenmeeting.pptx
@@ -196,7 +196,7 @@
           <a:p>
             <a:fld id="{C6D94C7C-7B43-EC42-8B62-DB85873491A7}" type="datetimeFigureOut">
               <a:rPr lang="de-DE" smtClean="0"/>
-              <a:t>28.05.15</a:t>
+              <a:t>29.05.15</a:t>
             </a:fld>
             <a:endParaRPr lang="de-DE"/>
           </a:p>
@@ -361,7 +361,7 @@
           <a:p>
             <a:fld id="{3B96DB63-E729-FD4F-B15C-F29E57992872}" type="datetimeFigureOut">
               <a:rPr lang="de-DE" smtClean="0"/>
-              <a:t>28.05.15</a:t>
+              <a:t>29.05.15</a:t>
             </a:fld>
             <a:endParaRPr lang="de-DE"/>
           </a:p>
@@ -1241,7 +1241,7 @@
           <a:p>
             <a:fld id="{FF5B2BAF-DF38-0A48-A798-0C06E514FD52}" type="datetimeFigureOut">
               <a:rPr lang="de-DE" smtClean="0"/>
-              <a:t>28.05.15</a:t>
+              <a:t>29.05.15</a:t>
             </a:fld>
             <a:endParaRPr lang="de-DE" dirty="0"/>
           </a:p>
@@ -1326,6 +1326,53 @@
       </p:grpSpPr>
       <p:sp>
         <p:nvSpPr>
+          <p:cNvPr id="12" name="Rechteck 11"/>
+          <p:cNvSpPr/>
+          <p:nvPr userDrawn="1"/>
+        </p:nvSpPr>
+        <p:spPr>
+          <a:xfrm>
+            <a:off x="0" y="0"/>
+            <a:ext cx="7562850" cy="5330825"/>
+          </a:xfrm>
+          <a:prstGeom prst="rect">
+            <a:avLst/>
+          </a:prstGeom>
+          <a:noFill/>
+          <a:ln>
+            <a:solidFill>
+              <a:schemeClr val="bg1">
+                <a:lumMod val="75000"/>
+              </a:schemeClr>
+            </a:solidFill>
+          </a:ln>
+          <a:effectLst/>
+        </p:spPr>
+        <p:style>
+          <a:lnRef idx="1">
+            <a:schemeClr val="accent1"/>
+          </a:lnRef>
+          <a:fillRef idx="3">
+            <a:schemeClr val="accent1"/>
+          </a:fillRef>
+          <a:effectRef idx="2">
+            <a:schemeClr val="accent1"/>
+          </a:effectRef>
+          <a:fontRef idx="minor">
+            <a:schemeClr val="lt1"/>
+          </a:fontRef>
+        </p:style>
+        <p:txBody>
+          <a:bodyPr rtlCol="0" anchor="ctr"/>
+          <a:lstStyle/>
+          <a:p>
+            <a:pPr algn="ctr"/>
+            <a:endParaRPr lang="de-DE"/>
+          </a:p>
+        </p:txBody>
+      </p:sp>
+      <p:sp>
+        <p:nvSpPr>
           <p:cNvPr id="2" name="Titelplatzhalter 1"/>
           <p:cNvSpPr>
             <a:spLocks noGrp="1"/>
@@ -1464,7 +1511,7 @@
           <a:p>
             <a:fld id="{FF5B2BAF-DF38-0A48-A798-0C06E514FD52}" type="datetimeFigureOut">
               <a:rPr lang="de-DE" smtClean="0"/>
-              <a:t>28.05.15</a:t>
+              <a:t>29.05.15</a:t>
             </a:fld>
             <a:endParaRPr lang="de-DE" dirty="0"/>
           </a:p>
@@ -1695,7 +1742,27 @@
                 <a:latin typeface="Avenir Heavy"/>
                 <a:cs typeface="Avenir Heavy"/>
               </a:rPr>
-              <a:t>TOM-06</a:t>
+              <a:t>TOM</a:t>
+            </a:r>
+            <a:r>
+              <a:rPr lang="de-DE" sz="1050" b="1" baseline="0" dirty="0" smtClean="0">
+                <a:solidFill>
+                  <a:schemeClr val="bg1"/>
+                </a:solidFill>
+                <a:latin typeface="Avenir Heavy"/>
+                <a:cs typeface="Avenir Heavy"/>
+              </a:rPr>
+              <a:t> </a:t>
+            </a:r>
+            <a:r>
+              <a:rPr lang="de-DE" sz="1050" b="1" dirty="0" smtClean="0">
+                <a:solidFill>
+                  <a:schemeClr val="bg1"/>
+                </a:solidFill>
+                <a:latin typeface="Avenir Heavy"/>
+                <a:cs typeface="Avenir Heavy"/>
+              </a:rPr>
+              <a:t>06</a:t>
             </a:r>
             <a:endParaRPr lang="de-DE" sz="1050" b="1" dirty="0">
               <a:solidFill>
@@ -2136,15 +2203,7 @@
             </a:r>
             <a:r>
               <a:rPr lang="de-DE" dirty="0" smtClean="0"/>
-              <a:t>eines Treffens transparent </a:t>
-            </a:r>
-            <a:r>
-              <a:rPr lang="de-DE" dirty="0" smtClean="0"/>
-              <a:t>sind, </a:t>
-            </a:r>
-            <a:r>
-              <a:rPr lang="de-DE" dirty="0" smtClean="0"/>
-              <a:t>kann die knappe Zeit effizienter genutzt werden. Außerdem macht es mehr Spaß, </a:t>
+              <a:t>eines Treffens transparent sind, kann die knappe Zeit effizienter genutzt werden. Außerdem macht es mehr Spaß, </a:t>
             </a:r>
             <a:r>
               <a:rPr lang="de-DE" dirty="0"/>
@@ -2243,15 +2302,7 @@
             </a:r>
             <a:r>
               <a:rPr lang="de-DE" dirty="0" smtClean="0"/>
-              <a:t>passen und klare </a:t>
-            </a:r>
-            <a:r>
-              <a:rPr lang="de-DE" dirty="0" smtClean="0"/>
-              <a:t>Teilziele </a:t>
-            </a:r>
-            <a:r>
-              <a:rPr lang="de-DE" dirty="0" smtClean="0"/>
-              <a:t>aufweisen. </a:t>
+              <a:t>passen und klare Teilziele aufweisen. </a:t>
             </a:r>
           </a:p>
           <a:p>

</xml_diff>